<commit_message>
modifyed Project configuration Image #1901
</commit_message>
<xml_diff>
--- a/source/ArchitectureInDetail/WebServiceDetail/images_SOAP/materialSOAP.pptx
+++ b/source/ArchitectureInDetail/WebServiceDetail/images_SOAP/materialSOAP.pptx
@@ -1,6 +1,6 @@
 
 <file path=ppt/presentation.xml><?xml version="1.0" encoding="utf-8"?>
-<p:presentation xmlns:a="http://schemas.openxmlformats.org/drawingml/2006/main" xmlns:r="http://schemas.openxmlformats.org/officeDocument/2006/relationships" xmlns:p="http://schemas.openxmlformats.org/presentationml/2006/main" saveSubsetFonts="1" autoCompressPictures="0">
+<p:presentation xmlns:a="http://schemas.openxmlformats.org/drawingml/2006/main" xmlns:r="http://schemas.openxmlformats.org/officeDocument/2006/relationships" xmlns:p="http://schemas.openxmlformats.org/presentationml/2006/main" saveSubsetFonts="1">
   <p:sldMasterIdLst>
     <p:sldMasterId id="2147483648" r:id="rId1"/>
   </p:sldMasterIdLst>
@@ -23,7 +23,7 @@
     <p:sldId id="307" r:id="rId14"/>
   </p:sldIdLst>
   <p:sldSz cx="9144000" cy="6858000" type="screen4x3"/>
-  <p:notesSz cx="6858000" cy="9144000"/>
+  <p:notesSz cx="6807200" cy="9939338"/>
   <p:defaultTextStyle>
     <a:defPPr>
       <a:defRPr lang="ja-JP"/>
@@ -119,6 +119,25 @@
       </a:defRPr>
     </a:lvl9pPr>
   </p:defaultTextStyle>
+  <p:extLst>
+    <p:ext uri="{EFAFB233-063F-42B5-8137-9DF3F51BA10A}">
+      <p15:sldGuideLst xmlns:p15="http://schemas.microsoft.com/office/powerpoint/2012/main">
+        <p15:guide id="1" orient="horz" pos="2160">
+          <p15:clr>
+            <a:srgbClr val="A4A3A4"/>
+          </p15:clr>
+        </p15:guide>
+        <p15:guide id="2" pos="2880">
+          <p15:clr>
+            <a:srgbClr val="A4A3A4"/>
+          </p15:clr>
+        </p15:guide>
+      </p15:sldGuideLst>
+    </p:ext>
+    <p:ext uri="{2D200454-40CA-4A62-9FC3-DE9A4176ACB9}">
+      <p15:notesGuideLst xmlns:p15="http://schemas.microsoft.com/office/powerpoint/2012/main"/>
+    </p:ext>
+  </p:extLst>
 </p:presentation>
 </file>
 
@@ -157,7 +176,7 @@
         <p:spPr>
           <a:xfrm>
             <a:off x="0" y="0"/>
-            <a:ext cx="2971800" cy="457200"/>
+            <a:ext cx="2949787" cy="496967"/>
           </a:xfrm>
           <a:prstGeom prst="rect">
             <a:avLst/>
@@ -187,8 +206,8 @@
         </p:nvSpPr>
         <p:spPr>
           <a:xfrm>
-            <a:off x="3884613" y="0"/>
-            <a:ext cx="2971800" cy="457200"/>
+            <a:off x="3855838" y="0"/>
+            <a:ext cx="2949787" cy="496967"/>
           </a:xfrm>
           <a:prstGeom prst="rect">
             <a:avLst/>
@@ -205,7 +224,7 @@
             <a:fld id="{3BB47352-BF5A-4CD2-B029-996118CD8E01}" type="datetimeFigureOut">
               <a:rPr kumimoji="1" lang="ja-JP" altLang="en-US" smtClean="0"/>
               <a:pPr/>
-              <a:t>2015/12/14</a:t>
+              <a:t>2016/6/21</a:t>
             </a:fld>
             <a:endParaRPr kumimoji="1" lang="ja-JP" altLang="en-US" dirty="0"/>
           </a:p>
@@ -223,8 +242,8 @@
         </p:nvSpPr>
         <p:spPr>
           <a:xfrm>
-            <a:off x="1143000" y="685800"/>
-            <a:ext cx="4572000" cy="3429000"/>
+            <a:off x="920750" y="746125"/>
+            <a:ext cx="4965700" cy="3725863"/>
           </a:xfrm>
           <a:prstGeom prst="rect">
             <a:avLst/>
@@ -256,8 +275,8 @@
         </p:nvSpPr>
         <p:spPr>
           <a:xfrm>
-            <a:off x="685800" y="4343400"/>
-            <a:ext cx="5486400" cy="4114800"/>
+            <a:off x="680720" y="4721186"/>
+            <a:ext cx="5445760" cy="4472702"/>
           </a:xfrm>
           <a:prstGeom prst="rect">
             <a:avLst/>
@@ -348,8 +367,8 @@
         </p:nvSpPr>
         <p:spPr>
           <a:xfrm>
-            <a:off x="0" y="8685213"/>
-            <a:ext cx="2971800" cy="457200"/>
+            <a:off x="0" y="9440646"/>
+            <a:ext cx="2949787" cy="496967"/>
           </a:xfrm>
           <a:prstGeom prst="rect">
             <a:avLst/>
@@ -379,8 +398,8 @@
         </p:nvSpPr>
         <p:spPr>
           <a:xfrm>
-            <a:off x="3884613" y="8685213"/>
-            <a:ext cx="2971800" cy="457200"/>
+            <a:off x="3855838" y="9440646"/>
+            <a:ext cx="2949787" cy="496967"/>
           </a:xfrm>
           <a:prstGeom prst="rect">
             <a:avLst/>
@@ -397,7 +416,7 @@
             <a:fld id="{003CFFA3-9D07-4088-826B-DF328166082C}" type="slidenum">
               <a:rPr kumimoji="1" lang="ja-JP" altLang="en-US" smtClean="0"/>
               <a:pPr/>
-              <a:t>&lt;#&gt;</a:t>
+              <a:t>‹#›</a:t>
             </a:fld>
             <a:endParaRPr kumimoji="1" lang="ja-JP" altLang="en-US" dirty="0"/>
           </a:p>
@@ -406,7 +425,7 @@
     </p:spTree>
     <p:extLst>
       <p:ext uri="{BB962C8B-B14F-4D97-AF65-F5344CB8AC3E}">
-        <p14:creationId xmlns="" xmlns:p14="http://schemas.microsoft.com/office/powerpoint/2010/main" val="1563212060"/>
+        <p14:creationId xmlns:p14="http://schemas.microsoft.com/office/powerpoint/2010/main" val="1563212060"/>
       </p:ext>
     </p:extLst>
   </p:cSld>
@@ -581,6 +600,11 @@
         </p:txBody>
       </p:sp>
     </p:spTree>
+    <p:extLst>
+      <p:ext uri="{BB962C8B-B14F-4D97-AF65-F5344CB8AC3E}">
+        <p14:creationId xmlns:p14="http://schemas.microsoft.com/office/powerpoint/2010/main" val="1144071520"/>
+      </p:ext>
+    </p:extLst>
   </p:cSld>
   <p:clrMapOvr>
     <a:masterClrMapping/>
@@ -663,6 +687,11 @@
         </p:txBody>
       </p:sp>
     </p:spTree>
+    <p:extLst>
+      <p:ext uri="{BB962C8B-B14F-4D97-AF65-F5344CB8AC3E}">
+        <p14:creationId xmlns:p14="http://schemas.microsoft.com/office/powerpoint/2010/main" val="1503156383"/>
+      </p:ext>
+    </p:extLst>
   </p:cSld>
   <p:clrMapOvr>
     <a:masterClrMapping/>
@@ -745,6 +774,11 @@
         </p:txBody>
       </p:sp>
     </p:spTree>
+    <p:extLst>
+      <p:ext uri="{BB962C8B-B14F-4D97-AF65-F5344CB8AC3E}">
+        <p14:creationId xmlns:p14="http://schemas.microsoft.com/office/powerpoint/2010/main" val="1630588507"/>
+      </p:ext>
+    </p:extLst>
   </p:cSld>
   <p:clrMapOvr>
     <a:masterClrMapping/>
@@ -771,7 +805,7 @@
       </p:grpSpPr>
       <p:sp>
         <p:nvSpPr>
-          <p:cNvPr id="2" name="スライド イメージ プレースホルダ 1"/>
+          <p:cNvPr id="2" name="スライド イメージ プレースホルダー 1"/>
           <p:cNvSpPr>
             <a:spLocks noGrp="1" noRot="1" noChangeAspect="1"/>
           </p:cNvSpPr>
@@ -783,7 +817,7 @@
       </p:sp>
       <p:sp>
         <p:nvSpPr>
-          <p:cNvPr id="3" name="ノート プレースホルダ 2"/>
+          <p:cNvPr id="3" name="ノート プレースホルダー 2"/>
           <p:cNvSpPr>
             <a:spLocks noGrp="1"/>
           </p:cNvSpPr>
@@ -793,18 +827,16 @@
         </p:nvSpPr>
         <p:spPr/>
         <p:txBody>
-          <a:bodyPr>
-            <a:normAutofit/>
-          </a:bodyPr>
-          <a:lstStyle/>
-          <a:p>
-            <a:endParaRPr kumimoji="1" lang="ja-JP" altLang="en-US" dirty="0"/>
-          </a:p>
-        </p:txBody>
-      </p:sp>
-      <p:sp>
-        <p:nvSpPr>
-          <p:cNvPr id="4" name="スライド番号プレースホルダ 3"/>
+          <a:bodyPr/>
+          <a:lstStyle/>
+          <a:p>
+            <a:endParaRPr kumimoji="1" lang="ja-JP" altLang="en-US"/>
+          </a:p>
+        </p:txBody>
+      </p:sp>
+      <p:sp>
+        <p:nvSpPr>
+          <p:cNvPr id="4" name="スライド番号プレースホルダー 3"/>
           <p:cNvSpPr>
             <a:spLocks noGrp="1"/>
           </p:cNvSpPr>
@@ -820,13 +852,18 @@
             <a:fld id="{003CFFA3-9D07-4088-826B-DF328166082C}" type="slidenum">
               <a:rPr kumimoji="1" lang="ja-JP" altLang="en-US" smtClean="0"/>
               <a:pPr/>
-              <a:t>9</a:t>
+              <a:t>5</a:t>
             </a:fld>
             <a:endParaRPr kumimoji="1" lang="ja-JP" altLang="en-US" dirty="0"/>
           </a:p>
         </p:txBody>
       </p:sp>
     </p:spTree>
+    <p:extLst>
+      <p:ext uri="{BB962C8B-B14F-4D97-AF65-F5344CB8AC3E}">
+        <p14:creationId xmlns:p14="http://schemas.microsoft.com/office/powerpoint/2010/main" val="1542588151"/>
+      </p:ext>
+    </p:extLst>
   </p:cSld>
   <p:clrMapOvr>
     <a:masterClrMapping/>
@@ -902,13 +939,18 @@
             <a:fld id="{003CFFA3-9D07-4088-826B-DF328166082C}" type="slidenum">
               <a:rPr kumimoji="1" lang="ja-JP" altLang="en-US" smtClean="0"/>
               <a:pPr/>
-              <a:t>10</a:t>
+              <a:t>9</a:t>
             </a:fld>
             <a:endParaRPr kumimoji="1" lang="ja-JP" altLang="en-US" dirty="0"/>
           </a:p>
         </p:txBody>
       </p:sp>
     </p:spTree>
+    <p:extLst>
+      <p:ext uri="{BB962C8B-B14F-4D97-AF65-F5344CB8AC3E}">
+        <p14:creationId xmlns:p14="http://schemas.microsoft.com/office/powerpoint/2010/main" val="3045160725"/>
+      </p:ext>
+    </p:extLst>
   </p:cSld>
   <p:clrMapOvr>
     <a:masterClrMapping/>
@@ -984,13 +1026,18 @@
             <a:fld id="{003CFFA3-9D07-4088-826B-DF328166082C}" type="slidenum">
               <a:rPr kumimoji="1" lang="ja-JP" altLang="en-US" smtClean="0"/>
               <a:pPr/>
-              <a:t>11</a:t>
+              <a:t>10</a:t>
             </a:fld>
             <a:endParaRPr kumimoji="1" lang="ja-JP" altLang="en-US" dirty="0"/>
           </a:p>
         </p:txBody>
       </p:sp>
     </p:spTree>
+    <p:extLst>
+      <p:ext uri="{BB962C8B-B14F-4D97-AF65-F5344CB8AC3E}">
+        <p14:creationId xmlns:p14="http://schemas.microsoft.com/office/powerpoint/2010/main" val="2409562027"/>
+      </p:ext>
+    </p:extLst>
   </p:cSld>
   <p:clrMapOvr>
     <a:masterClrMapping/>
@@ -1066,6 +1113,93 @@
             <a:fld id="{003CFFA3-9D07-4088-826B-DF328166082C}" type="slidenum">
               <a:rPr kumimoji="1" lang="ja-JP" altLang="en-US" smtClean="0"/>
               <a:pPr/>
+              <a:t>11</a:t>
+            </a:fld>
+            <a:endParaRPr kumimoji="1" lang="ja-JP" altLang="en-US" dirty="0"/>
+          </a:p>
+        </p:txBody>
+      </p:sp>
+    </p:spTree>
+    <p:extLst>
+      <p:ext uri="{BB962C8B-B14F-4D97-AF65-F5344CB8AC3E}">
+        <p14:creationId xmlns:p14="http://schemas.microsoft.com/office/powerpoint/2010/main" val="2148347479"/>
+      </p:ext>
+    </p:extLst>
+  </p:cSld>
+  <p:clrMapOvr>
+    <a:masterClrMapping/>
+  </p:clrMapOvr>
+</p:notes>
+</file>
+
+<file path=ppt/notesSlides/notesSlide8.xml><?xml version="1.0" encoding="utf-8"?>
+<p:notes xmlns:a="http://schemas.openxmlformats.org/drawingml/2006/main" xmlns:r="http://schemas.openxmlformats.org/officeDocument/2006/relationships" xmlns:p="http://schemas.openxmlformats.org/presentationml/2006/main">
+  <p:cSld>
+    <p:spTree>
+      <p:nvGrpSpPr>
+        <p:cNvPr id="1" name=""/>
+        <p:cNvGrpSpPr/>
+        <p:nvPr/>
+      </p:nvGrpSpPr>
+      <p:grpSpPr>
+        <a:xfrm>
+          <a:off x="0" y="0"/>
+          <a:ext cx="0" cy="0"/>
+          <a:chOff x="0" y="0"/>
+          <a:chExt cx="0" cy="0"/>
+        </a:xfrm>
+      </p:grpSpPr>
+      <p:sp>
+        <p:nvSpPr>
+          <p:cNvPr id="2" name="スライド イメージ プレースホルダ 1"/>
+          <p:cNvSpPr>
+            <a:spLocks noGrp="1" noRot="1" noChangeAspect="1"/>
+          </p:cNvSpPr>
+          <p:nvPr>
+            <p:ph type="sldImg"/>
+          </p:nvPr>
+        </p:nvSpPr>
+        <p:spPr/>
+      </p:sp>
+      <p:sp>
+        <p:nvSpPr>
+          <p:cNvPr id="3" name="ノート プレースホルダ 2"/>
+          <p:cNvSpPr>
+            <a:spLocks noGrp="1"/>
+          </p:cNvSpPr>
+          <p:nvPr>
+            <p:ph type="body" idx="1"/>
+          </p:nvPr>
+        </p:nvSpPr>
+        <p:spPr/>
+        <p:txBody>
+          <a:bodyPr>
+            <a:normAutofit/>
+          </a:bodyPr>
+          <a:lstStyle/>
+          <a:p>
+            <a:endParaRPr kumimoji="1" lang="ja-JP" altLang="en-US" dirty="0"/>
+          </a:p>
+        </p:txBody>
+      </p:sp>
+      <p:sp>
+        <p:nvSpPr>
+          <p:cNvPr id="4" name="スライド番号プレースホルダ 3"/>
+          <p:cNvSpPr>
+            <a:spLocks noGrp="1"/>
+          </p:cNvSpPr>
+          <p:nvPr>
+            <p:ph type="sldNum" sz="quarter" idx="10"/>
+          </p:nvPr>
+        </p:nvSpPr>
+        <p:spPr/>
+        <p:txBody>
+          <a:bodyPr/>
+          <a:lstStyle/>
+          <a:p>
+            <a:fld id="{003CFFA3-9D07-4088-826B-DF328166082C}" type="slidenum">
+              <a:rPr kumimoji="1" lang="ja-JP" altLang="en-US" smtClean="0"/>
+              <a:pPr/>
               <a:t>12</a:t>
             </a:fld>
             <a:endParaRPr kumimoji="1" lang="ja-JP" altLang="en-US" dirty="0"/>
@@ -1073,6 +1207,11 @@
         </p:txBody>
       </p:sp>
     </p:spTree>
+    <p:extLst>
+      <p:ext uri="{BB962C8B-B14F-4D97-AF65-F5344CB8AC3E}">
+        <p14:creationId xmlns:p14="http://schemas.microsoft.com/office/powerpoint/2010/main" val="2840389330"/>
+      </p:ext>
+    </p:extLst>
   </p:cSld>
   <p:clrMapOvr>
     <a:masterClrMapping/>
@@ -1262,7 +1401,7 @@
             <a:fld id="{7B9B12EC-6AA0-374B-A2D3-850081A07A26}" type="datetimeFigureOut">
               <a:rPr kumimoji="1" lang="ja-JP" altLang="en-US" smtClean="0"/>
               <a:pPr/>
-              <a:t>2015/12/14</a:t>
+              <a:t>2016/6/21</a:t>
             </a:fld>
             <a:endParaRPr kumimoji="1" lang="ja-JP" altLang="en-US" dirty="0"/>
           </a:p>
@@ -1305,7 +1444,7 @@
             <a:fld id="{767EF739-006C-E447-A3B9-2B495A864FAC}" type="slidenum">
               <a:rPr kumimoji="1" lang="ja-JP" altLang="en-US" smtClean="0"/>
               <a:pPr/>
-              <a:t>&lt;#&gt;</a:t>
+              <a:t>‹#›</a:t>
             </a:fld>
             <a:endParaRPr kumimoji="1" lang="ja-JP" altLang="en-US" dirty="0"/>
           </a:p>
@@ -1314,7 +1453,7 @@
     </p:spTree>
     <p:extLst>
       <p:ext uri="{BB962C8B-B14F-4D97-AF65-F5344CB8AC3E}">
-        <p14:creationId xmlns="" xmlns:p14="http://schemas.microsoft.com/office/powerpoint/2010/main" val="2957268178"/>
+        <p14:creationId xmlns:p14="http://schemas.microsoft.com/office/powerpoint/2010/main" val="2957268178"/>
       </p:ext>
     </p:extLst>
   </p:cSld>
@@ -1466,7 +1605,7 @@
             <a:fld id="{7B9B12EC-6AA0-374B-A2D3-850081A07A26}" type="datetimeFigureOut">
               <a:rPr kumimoji="1" lang="ja-JP" altLang="en-US" smtClean="0"/>
               <a:pPr/>
-              <a:t>2015/12/14</a:t>
+              <a:t>2016/6/21</a:t>
             </a:fld>
             <a:endParaRPr kumimoji="1" lang="ja-JP" altLang="en-US" dirty="0"/>
           </a:p>
@@ -1509,7 +1648,7 @@
             <a:fld id="{767EF739-006C-E447-A3B9-2B495A864FAC}" type="slidenum">
               <a:rPr kumimoji="1" lang="ja-JP" altLang="en-US" smtClean="0"/>
               <a:pPr/>
-              <a:t>&lt;#&gt;</a:t>
+              <a:t>‹#›</a:t>
             </a:fld>
             <a:endParaRPr kumimoji="1" lang="ja-JP" altLang="en-US" dirty="0"/>
           </a:p>
@@ -1518,7 +1657,7 @@
     </p:spTree>
     <p:extLst>
       <p:ext uri="{BB962C8B-B14F-4D97-AF65-F5344CB8AC3E}">
-        <p14:creationId xmlns="" xmlns:p14="http://schemas.microsoft.com/office/powerpoint/2010/main" val="99248395"/>
+        <p14:creationId xmlns:p14="http://schemas.microsoft.com/office/powerpoint/2010/main" val="99248395"/>
       </p:ext>
     </p:extLst>
   </p:cSld>
@@ -1680,7 +1819,7 @@
             <a:fld id="{7B9B12EC-6AA0-374B-A2D3-850081A07A26}" type="datetimeFigureOut">
               <a:rPr kumimoji="1" lang="ja-JP" altLang="en-US" smtClean="0"/>
               <a:pPr/>
-              <a:t>2015/12/14</a:t>
+              <a:t>2016/6/21</a:t>
             </a:fld>
             <a:endParaRPr kumimoji="1" lang="ja-JP" altLang="en-US" dirty="0"/>
           </a:p>
@@ -1723,7 +1862,7 @@
             <a:fld id="{767EF739-006C-E447-A3B9-2B495A864FAC}" type="slidenum">
               <a:rPr kumimoji="1" lang="ja-JP" altLang="en-US" smtClean="0"/>
               <a:pPr/>
-              <a:t>&lt;#&gt;</a:t>
+              <a:t>‹#›</a:t>
             </a:fld>
             <a:endParaRPr kumimoji="1" lang="ja-JP" altLang="en-US" dirty="0"/>
           </a:p>
@@ -1732,7 +1871,7 @@
     </p:spTree>
     <p:extLst>
       <p:ext uri="{BB962C8B-B14F-4D97-AF65-F5344CB8AC3E}">
-        <p14:creationId xmlns="" xmlns:p14="http://schemas.microsoft.com/office/powerpoint/2010/main" val="75369614"/>
+        <p14:creationId xmlns:p14="http://schemas.microsoft.com/office/powerpoint/2010/main" val="75369614"/>
       </p:ext>
     </p:extLst>
   </p:cSld>
@@ -1884,7 +2023,7 @@
             <a:fld id="{7B9B12EC-6AA0-374B-A2D3-850081A07A26}" type="datetimeFigureOut">
               <a:rPr kumimoji="1" lang="ja-JP" altLang="en-US" smtClean="0"/>
               <a:pPr/>
-              <a:t>2015/12/14</a:t>
+              <a:t>2016/6/21</a:t>
             </a:fld>
             <a:endParaRPr kumimoji="1" lang="ja-JP" altLang="en-US" dirty="0"/>
           </a:p>
@@ -1927,7 +2066,7 @@
             <a:fld id="{767EF739-006C-E447-A3B9-2B495A864FAC}" type="slidenum">
               <a:rPr kumimoji="1" lang="ja-JP" altLang="en-US" smtClean="0"/>
               <a:pPr/>
-              <a:t>&lt;#&gt;</a:t>
+              <a:t>‹#›</a:t>
             </a:fld>
             <a:endParaRPr kumimoji="1" lang="ja-JP" altLang="en-US" dirty="0"/>
           </a:p>
@@ -1936,7 +2075,7 @@
     </p:spTree>
     <p:extLst>
       <p:ext uri="{BB962C8B-B14F-4D97-AF65-F5344CB8AC3E}">
-        <p14:creationId xmlns="" xmlns:p14="http://schemas.microsoft.com/office/powerpoint/2010/main" val="956610528"/>
+        <p14:creationId xmlns:p14="http://schemas.microsoft.com/office/powerpoint/2010/main" val="956610528"/>
       </p:ext>
     </p:extLst>
   </p:cSld>
@@ -2132,7 +2271,7 @@
             <a:fld id="{7B9B12EC-6AA0-374B-A2D3-850081A07A26}" type="datetimeFigureOut">
               <a:rPr kumimoji="1" lang="ja-JP" altLang="en-US" smtClean="0"/>
               <a:pPr/>
-              <a:t>2015/12/14</a:t>
+              <a:t>2016/6/21</a:t>
             </a:fld>
             <a:endParaRPr kumimoji="1" lang="ja-JP" altLang="en-US" dirty="0"/>
           </a:p>
@@ -2175,7 +2314,7 @@
             <a:fld id="{767EF739-006C-E447-A3B9-2B495A864FAC}" type="slidenum">
               <a:rPr kumimoji="1" lang="ja-JP" altLang="en-US" smtClean="0"/>
               <a:pPr/>
-              <a:t>&lt;#&gt;</a:t>
+              <a:t>‹#›</a:t>
             </a:fld>
             <a:endParaRPr kumimoji="1" lang="ja-JP" altLang="en-US" dirty="0"/>
           </a:p>
@@ -2184,7 +2323,7 @@
     </p:spTree>
     <p:extLst>
       <p:ext uri="{BB962C8B-B14F-4D97-AF65-F5344CB8AC3E}">
-        <p14:creationId xmlns="" xmlns:p14="http://schemas.microsoft.com/office/powerpoint/2010/main" val="492095304"/>
+        <p14:creationId xmlns:p14="http://schemas.microsoft.com/office/powerpoint/2010/main" val="492095304"/>
       </p:ext>
     </p:extLst>
   </p:cSld>
@@ -2486,7 +2625,7 @@
             <a:fld id="{7B9B12EC-6AA0-374B-A2D3-850081A07A26}" type="datetimeFigureOut">
               <a:rPr kumimoji="1" lang="ja-JP" altLang="en-US" smtClean="0"/>
               <a:pPr/>
-              <a:t>2015/12/14</a:t>
+              <a:t>2016/6/21</a:t>
             </a:fld>
             <a:endParaRPr kumimoji="1" lang="ja-JP" altLang="en-US" dirty="0"/>
           </a:p>
@@ -2529,7 +2668,7 @@
             <a:fld id="{767EF739-006C-E447-A3B9-2B495A864FAC}" type="slidenum">
               <a:rPr kumimoji="1" lang="ja-JP" altLang="en-US" smtClean="0"/>
               <a:pPr/>
-              <a:t>&lt;#&gt;</a:t>
+              <a:t>‹#›</a:t>
             </a:fld>
             <a:endParaRPr kumimoji="1" lang="ja-JP" altLang="en-US" dirty="0"/>
           </a:p>
@@ -2538,7 +2677,7 @@
     </p:spTree>
     <p:extLst>
       <p:ext uri="{BB962C8B-B14F-4D97-AF65-F5344CB8AC3E}">
-        <p14:creationId xmlns="" xmlns:p14="http://schemas.microsoft.com/office/powerpoint/2010/main" val="1557712202"/>
+        <p14:creationId xmlns:p14="http://schemas.microsoft.com/office/powerpoint/2010/main" val="1557712202"/>
       </p:ext>
     </p:extLst>
   </p:cSld>
@@ -2974,7 +3113,7 @@
             <a:fld id="{7B9B12EC-6AA0-374B-A2D3-850081A07A26}" type="datetimeFigureOut">
               <a:rPr kumimoji="1" lang="ja-JP" altLang="en-US" smtClean="0"/>
               <a:pPr/>
-              <a:t>2015/12/14</a:t>
+              <a:t>2016/6/21</a:t>
             </a:fld>
             <a:endParaRPr kumimoji="1" lang="ja-JP" altLang="en-US" dirty="0"/>
           </a:p>
@@ -3017,7 +3156,7 @@
             <a:fld id="{767EF739-006C-E447-A3B9-2B495A864FAC}" type="slidenum">
               <a:rPr kumimoji="1" lang="ja-JP" altLang="en-US" smtClean="0"/>
               <a:pPr/>
-              <a:t>&lt;#&gt;</a:t>
+              <a:t>‹#›</a:t>
             </a:fld>
             <a:endParaRPr kumimoji="1" lang="ja-JP" altLang="en-US" dirty="0"/>
           </a:p>
@@ -3026,7 +3165,7 @@
     </p:spTree>
     <p:extLst>
       <p:ext uri="{BB962C8B-B14F-4D97-AF65-F5344CB8AC3E}">
-        <p14:creationId xmlns="" xmlns:p14="http://schemas.microsoft.com/office/powerpoint/2010/main" val="638338655"/>
+        <p14:creationId xmlns:p14="http://schemas.microsoft.com/office/powerpoint/2010/main" val="638338655"/>
       </p:ext>
     </p:extLst>
   </p:cSld>
@@ -3094,7 +3233,7 @@
             <a:fld id="{7B9B12EC-6AA0-374B-A2D3-850081A07A26}" type="datetimeFigureOut">
               <a:rPr kumimoji="1" lang="ja-JP" altLang="en-US" smtClean="0"/>
               <a:pPr/>
-              <a:t>2015/12/14</a:t>
+              <a:t>2016/6/21</a:t>
             </a:fld>
             <a:endParaRPr kumimoji="1" lang="ja-JP" altLang="en-US" dirty="0"/>
           </a:p>
@@ -3137,7 +3276,7 @@
             <a:fld id="{767EF739-006C-E447-A3B9-2B495A864FAC}" type="slidenum">
               <a:rPr kumimoji="1" lang="ja-JP" altLang="en-US" smtClean="0"/>
               <a:pPr/>
-              <a:t>&lt;#&gt;</a:t>
+              <a:t>‹#›</a:t>
             </a:fld>
             <a:endParaRPr kumimoji="1" lang="ja-JP" altLang="en-US" dirty="0"/>
           </a:p>
@@ -3146,7 +3285,7 @@
     </p:spTree>
     <p:extLst>
       <p:ext uri="{BB962C8B-B14F-4D97-AF65-F5344CB8AC3E}">
-        <p14:creationId xmlns="" xmlns:p14="http://schemas.microsoft.com/office/powerpoint/2010/main" val="2063778013"/>
+        <p14:creationId xmlns:p14="http://schemas.microsoft.com/office/powerpoint/2010/main" val="2063778013"/>
       </p:ext>
     </p:extLst>
   </p:cSld>
@@ -3191,7 +3330,7 @@
             <a:fld id="{7B9B12EC-6AA0-374B-A2D3-850081A07A26}" type="datetimeFigureOut">
               <a:rPr kumimoji="1" lang="ja-JP" altLang="en-US" smtClean="0"/>
               <a:pPr/>
-              <a:t>2015/12/14</a:t>
+              <a:t>2016/6/21</a:t>
             </a:fld>
             <a:endParaRPr kumimoji="1" lang="ja-JP" altLang="en-US" dirty="0"/>
           </a:p>
@@ -3234,7 +3373,7 @@
             <a:fld id="{767EF739-006C-E447-A3B9-2B495A864FAC}" type="slidenum">
               <a:rPr kumimoji="1" lang="ja-JP" altLang="en-US" smtClean="0"/>
               <a:pPr/>
-              <a:t>&lt;#&gt;</a:t>
+              <a:t>‹#›</a:t>
             </a:fld>
             <a:endParaRPr kumimoji="1" lang="ja-JP" altLang="en-US" dirty="0"/>
           </a:p>
@@ -3243,7 +3382,7 @@
     </p:spTree>
     <p:extLst>
       <p:ext uri="{BB962C8B-B14F-4D97-AF65-F5344CB8AC3E}">
-        <p14:creationId xmlns="" xmlns:p14="http://schemas.microsoft.com/office/powerpoint/2010/main" val="1575323657"/>
+        <p14:creationId xmlns:p14="http://schemas.microsoft.com/office/powerpoint/2010/main" val="1575323657"/>
       </p:ext>
     </p:extLst>
   </p:cSld>
@@ -3502,7 +3641,7 @@
             <a:fld id="{7B9B12EC-6AA0-374B-A2D3-850081A07A26}" type="datetimeFigureOut">
               <a:rPr kumimoji="1" lang="ja-JP" altLang="en-US" smtClean="0"/>
               <a:pPr/>
-              <a:t>2015/12/14</a:t>
+              <a:t>2016/6/21</a:t>
             </a:fld>
             <a:endParaRPr kumimoji="1" lang="ja-JP" altLang="en-US" dirty="0"/>
           </a:p>
@@ -3545,7 +3684,7 @@
             <a:fld id="{767EF739-006C-E447-A3B9-2B495A864FAC}" type="slidenum">
               <a:rPr kumimoji="1" lang="ja-JP" altLang="en-US" smtClean="0"/>
               <a:pPr/>
-              <a:t>&lt;#&gt;</a:t>
+              <a:t>‹#›</a:t>
             </a:fld>
             <a:endParaRPr kumimoji="1" lang="ja-JP" altLang="en-US" dirty="0"/>
           </a:p>
@@ -3554,7 +3693,7 @@
     </p:spTree>
     <p:extLst>
       <p:ext uri="{BB962C8B-B14F-4D97-AF65-F5344CB8AC3E}">
-        <p14:creationId xmlns="" xmlns:p14="http://schemas.microsoft.com/office/powerpoint/2010/main" val="3549694789"/>
+        <p14:creationId xmlns:p14="http://schemas.microsoft.com/office/powerpoint/2010/main" val="3549694789"/>
       </p:ext>
     </p:extLst>
   </p:cSld>
@@ -3757,7 +3896,7 @@
             <a:fld id="{7B9B12EC-6AA0-374B-A2D3-850081A07A26}" type="datetimeFigureOut">
               <a:rPr kumimoji="1" lang="ja-JP" altLang="en-US" smtClean="0"/>
               <a:pPr/>
-              <a:t>2015/12/14</a:t>
+              <a:t>2016/6/21</a:t>
             </a:fld>
             <a:endParaRPr kumimoji="1" lang="ja-JP" altLang="en-US" dirty="0"/>
           </a:p>
@@ -3800,7 +3939,7 @@
             <a:fld id="{767EF739-006C-E447-A3B9-2B495A864FAC}" type="slidenum">
               <a:rPr kumimoji="1" lang="ja-JP" altLang="en-US" smtClean="0"/>
               <a:pPr/>
-              <a:t>&lt;#&gt;</a:t>
+              <a:t>‹#›</a:t>
             </a:fld>
             <a:endParaRPr kumimoji="1" lang="ja-JP" altLang="en-US" dirty="0"/>
           </a:p>
@@ -3809,7 +3948,7 @@
     </p:spTree>
     <p:extLst>
       <p:ext uri="{BB962C8B-B14F-4D97-AF65-F5344CB8AC3E}">
-        <p14:creationId xmlns="" xmlns:p14="http://schemas.microsoft.com/office/powerpoint/2010/main" val="2928006269"/>
+        <p14:creationId xmlns:p14="http://schemas.microsoft.com/office/powerpoint/2010/main" val="2928006269"/>
       </p:ext>
     </p:extLst>
   </p:cSld>
@@ -4004,7 +4143,7 @@
             <a:fld id="{7B9B12EC-6AA0-374B-A2D3-850081A07A26}" type="datetimeFigureOut">
               <a:rPr kumimoji="1" lang="ja-JP" altLang="en-US" smtClean="0"/>
               <a:pPr/>
-              <a:t>2015/12/14</a:t>
+              <a:t>2016/6/21</a:t>
             </a:fld>
             <a:endParaRPr kumimoji="1" lang="ja-JP" altLang="en-US" dirty="0"/>
           </a:p>
@@ -4083,7 +4222,7 @@
             <a:fld id="{767EF739-006C-E447-A3B9-2B495A864FAC}" type="slidenum">
               <a:rPr kumimoji="1" lang="ja-JP" altLang="en-US" smtClean="0"/>
               <a:pPr/>
-              <a:t>&lt;#&gt;</a:t>
+              <a:t>‹#›</a:t>
             </a:fld>
             <a:endParaRPr kumimoji="1" lang="ja-JP" altLang="en-US" dirty="0"/>
           </a:p>
@@ -4092,7 +4231,7 @@
     </p:spTree>
     <p:extLst>
       <p:ext uri="{BB962C8B-B14F-4D97-AF65-F5344CB8AC3E}">
-        <p14:creationId xmlns="" xmlns:p14="http://schemas.microsoft.com/office/powerpoint/2010/main" val="1919167372"/>
+        <p14:creationId xmlns:p14="http://schemas.microsoft.com/office/powerpoint/2010/main" val="1919167372"/>
       </p:ext>
     </p:extLst>
   </p:cSld>
@@ -4433,75 +4572,10 @@
           <p:nvPr/>
         </p:nvPicPr>
         <p:blipFill>
-          <a:blip r:embed="rId2"/>
-          <a:srcRect/>
-          <a:stretch>
-            <a:fillRect/>
-          </a:stretch>
-        </p:blipFill>
-        <p:spPr bwMode="auto">
-          <a:xfrm>
-            <a:off x="292128" y="1488440"/>
-            <a:ext cx="660372" cy="684094"/>
-          </a:xfrm>
-          <a:prstGeom prst="rect">
-            <a:avLst/>
-          </a:prstGeom>
-          <a:noFill/>
-        </p:spPr>
-      </p:pic>
-      <p:sp>
-        <p:nvSpPr>
-          <p:cNvPr id="5" name="AutoShape 2" descr="https://encrypted-tbn3.gstatic.com/images?q=tbn:ANd9GcQZqttP4a-xMCICtIH4tGWHZmPMfvlz6AklORT-DhfKWJilxi4v"/>
-          <p:cNvSpPr>
-            <a:spLocks noChangeAspect="1" noChangeArrowheads="1"/>
-          </p:cNvSpPr>
-          <p:nvPr/>
-        </p:nvSpPr>
-        <p:spPr bwMode="auto">
-          <a:xfrm>
-            <a:off x="358775" y="23177"/>
-            <a:ext cx="304800" cy="304801"/>
-          </a:xfrm>
-          <a:prstGeom prst="rect">
-            <a:avLst/>
-          </a:prstGeom>
-          <a:noFill/>
-          <a:extLst>
-            <a:ext uri="{909E8E84-426E-40DD-AFC4-6F175D3DCCD1}">
-              <a14:hiddenFill xmlns="" xmlns:a14="http://schemas.microsoft.com/office/drawing/2010/main">
-                <a:solidFill>
-                  <a:srgbClr val="FFFFFF"/>
-                </a:solidFill>
-              </a14:hiddenFill>
-            </a:ext>
-          </a:extLst>
-        </p:spPr>
-        <p:txBody>
-          <a:bodyPr vert="horz" wrap="square" lIns="91440" tIns="45720" rIns="91440" bIns="45720" numCol="1" anchor="t" anchorCtr="0" compatLnSpc="1">
-            <a:prstTxWarp prst="textNoShape">
-              <a:avLst/>
-            </a:prstTxWarp>
-          </a:bodyPr>
-          <a:lstStyle/>
-          <a:p>
-            <a:endParaRPr lang="ja-JP" altLang="en-US"/>
-          </a:p>
-        </p:txBody>
-      </p:sp>
-      <p:pic>
-        <p:nvPicPr>
-          <p:cNvPr id="23" name="Picture 7" descr="C:\Users\btshimizukza\AppData\Local\Microsoft\Windows\Temporary Internet Files\Content.IE5\AYL3DS2N\MC900428969[1].wmf"/>
-          <p:cNvPicPr>
-            <a:picLocks noChangeAspect="1" noChangeArrowheads="1"/>
-          </p:cNvPicPr>
-          <p:nvPr/>
-        </p:nvPicPr>
-        <p:blipFill>
-          <a:blip r:embed="rId3">
+          <a:blip r:embed="rId2" cstate="email">
             <a:extLst>
               <a:ext uri="{28A0092B-C50C-407E-A947-70E740481C1C}">
-                <a14:useLocalDpi xmlns="" xmlns:a14="http://schemas.microsoft.com/office/drawing/2010/main" val="0"/>
+                <a14:useLocalDpi xmlns:a14="http://schemas.microsoft.com/office/drawing/2010/main"/>
               </a:ext>
             </a:extLst>
           </a:blip>
@@ -4512,8 +4586,27 @@
         </p:blipFill>
         <p:spPr bwMode="auto">
           <a:xfrm>
-            <a:off x="8245625" y="1924528"/>
-            <a:ext cx="523924" cy="726528"/>
+            <a:off x="292128" y="1488440"/>
+            <a:ext cx="660372" cy="684094"/>
+          </a:xfrm>
+          <a:prstGeom prst="rect">
+            <a:avLst/>
+          </a:prstGeom>
+          <a:noFill/>
+        </p:spPr>
+      </p:pic>
+      <p:sp>
+        <p:nvSpPr>
+          <p:cNvPr id="5" name="AutoShape 2" descr="https://encrypted-tbn3.gstatic.com/images?q=tbn:ANd9GcQZqttP4a-xMCICtIH4tGWHZmPMfvlz6AklORT-DhfKWJilxi4v"/>
+          <p:cNvSpPr>
+            <a:spLocks noChangeAspect="1" noChangeArrowheads="1"/>
+          </p:cNvSpPr>
+          <p:nvPr/>
+        </p:nvSpPr>
+        <p:spPr bwMode="auto">
+          <a:xfrm>
+            <a:off x="358775" y="23177"/>
+            <a:ext cx="304800" cy="304801"/>
           </a:xfrm>
           <a:prstGeom prst="rect">
             <a:avLst/>
@@ -4521,7 +4614,7 @@
           <a:noFill/>
           <a:extLst>
             <a:ext uri="{909E8E84-426E-40DD-AFC4-6F175D3DCCD1}">
-              <a14:hiddenFill xmlns="" xmlns:a14="http://schemas.microsoft.com/office/drawing/2010/main">
+              <a14:hiddenFill xmlns:a14="http://schemas.microsoft.com/office/drawing/2010/main">
                 <a:solidFill>
                   <a:srgbClr val="FFFFFF"/>
                 </a:solidFill>
@@ -4529,20 +4622,31 @@
             </a:ext>
           </a:extLst>
         </p:spPr>
-      </p:pic>
+        <p:txBody>
+          <a:bodyPr vert="horz" wrap="square" lIns="91440" tIns="45720" rIns="91440" bIns="45720" numCol="1" anchor="t" anchorCtr="0" compatLnSpc="1">
+            <a:prstTxWarp prst="textNoShape">
+              <a:avLst/>
+            </a:prstTxWarp>
+          </a:bodyPr>
+          <a:lstStyle/>
+          <a:p>
+            <a:endParaRPr lang="ja-JP" altLang="en-US"/>
+          </a:p>
+        </p:txBody>
+      </p:sp>
       <p:pic>
         <p:nvPicPr>
-          <p:cNvPr id="1044" name="Picture 20"/>
+          <p:cNvPr id="23" name="Picture 7" descr="C:\Users\btshimizukza\AppData\Local\Microsoft\Windows\Temporary Internet Files\Content.IE5\AYL3DS2N\MC900428969[1].wmf"/>
           <p:cNvPicPr>
             <a:picLocks noChangeAspect="1" noChangeArrowheads="1"/>
           </p:cNvPicPr>
           <p:nvPr/>
         </p:nvPicPr>
         <p:blipFill>
-          <a:blip r:embed="rId4">
+          <a:blip r:embed="rId3" cstate="email">
             <a:extLst>
               <a:ext uri="{28A0092B-C50C-407E-A947-70E740481C1C}">
-                <a14:useLocalDpi xmlns="" xmlns:a14="http://schemas.microsoft.com/office/drawing/2010/main" val="0"/>
+                <a14:useLocalDpi xmlns:a14="http://schemas.microsoft.com/office/drawing/2010/main"/>
               </a:ext>
             </a:extLst>
           </a:blip>
@@ -4553,6 +4657,47 @@
         </p:blipFill>
         <p:spPr bwMode="auto">
           <a:xfrm>
+            <a:off x="8245625" y="1924528"/>
+            <a:ext cx="523924" cy="726528"/>
+          </a:xfrm>
+          <a:prstGeom prst="rect">
+            <a:avLst/>
+          </a:prstGeom>
+          <a:noFill/>
+          <a:extLst>
+            <a:ext uri="{909E8E84-426E-40DD-AFC4-6F175D3DCCD1}">
+              <a14:hiddenFill xmlns:a14="http://schemas.microsoft.com/office/drawing/2010/main">
+                <a:solidFill>
+                  <a:srgbClr val="FFFFFF"/>
+                </a:solidFill>
+              </a14:hiddenFill>
+            </a:ext>
+          </a:extLst>
+        </p:spPr>
+      </p:pic>
+      <p:pic>
+        <p:nvPicPr>
+          <p:cNvPr id="1044" name="Picture 20"/>
+          <p:cNvPicPr>
+            <a:picLocks noChangeAspect="1" noChangeArrowheads="1"/>
+          </p:cNvPicPr>
+          <p:nvPr/>
+        </p:nvPicPr>
+        <p:blipFill>
+          <a:blip r:embed="rId4" cstate="email">
+            <a:extLst>
+              <a:ext uri="{28A0092B-C50C-407E-A947-70E740481C1C}">
+                <a14:useLocalDpi xmlns:a14="http://schemas.microsoft.com/office/drawing/2010/main"/>
+              </a:ext>
+            </a:extLst>
+          </a:blip>
+          <a:srcRect/>
+          <a:stretch>
+            <a:fillRect/>
+          </a:stretch>
+        </p:blipFill>
+        <p:spPr bwMode="auto">
+          <a:xfrm>
             <a:off x="8111196" y="1972266"/>
             <a:ext cx="269171" cy="296478"/>
           </a:xfrm>
@@ -4565,14 +4710,14 @@
           </a:ln>
           <a:extLst>
             <a:ext uri="{909E8E84-426E-40DD-AFC4-6F175D3DCCD1}">
-              <a14:hiddenFill xmlns="" xmlns:a14="http://schemas.microsoft.com/office/drawing/2010/main">
+              <a14:hiddenFill xmlns:a14="http://schemas.microsoft.com/office/drawing/2010/main">
                 <a:solidFill>
                   <a:schemeClr val="accent1"/>
                 </a:solidFill>
               </a14:hiddenFill>
             </a:ext>
             <a:ext uri="{91240B29-F687-4F45-9708-019B960494DF}">
-              <a14:hiddenLine xmlns="" xmlns:a14="http://schemas.microsoft.com/office/drawing/2010/main" w="9525">
+              <a14:hiddenLine xmlns:a14="http://schemas.microsoft.com/office/drawing/2010/main" w="9525">
                 <a:solidFill>
                   <a:schemeClr val="tx1"/>
                 </a:solidFill>
@@ -4751,10 +4896,10 @@
           <p:nvPr/>
         </p:nvPicPr>
         <p:blipFill>
-          <a:blip r:embed="rId3">
+          <a:blip r:embed="rId3" cstate="email">
             <a:extLst>
               <a:ext uri="{28A0092B-C50C-407E-A947-70E740481C1C}">
-                <a14:useLocalDpi xmlns="" xmlns:a14="http://schemas.microsoft.com/office/drawing/2010/main" val="0"/>
+                <a14:useLocalDpi xmlns:a14="http://schemas.microsoft.com/office/drawing/2010/main"/>
               </a:ext>
             </a:extLst>
           </a:blip>
@@ -4774,7 +4919,7 @@
           <a:noFill/>
           <a:extLst>
             <a:ext uri="{909E8E84-426E-40DD-AFC4-6F175D3DCCD1}">
-              <a14:hiddenFill xmlns="" xmlns:a14="http://schemas.microsoft.com/office/drawing/2010/main">
+              <a14:hiddenFill xmlns:a14="http://schemas.microsoft.com/office/drawing/2010/main">
                 <a:solidFill>
                   <a:srgbClr val="FFFFFF"/>
                 </a:solidFill>
@@ -4792,10 +4937,10 @@
           <p:nvPr/>
         </p:nvPicPr>
         <p:blipFill>
-          <a:blip r:embed="rId5">
+          <a:blip r:embed="rId5" cstate="print">
             <a:extLst>
               <a:ext uri="{28A0092B-C50C-407E-A947-70E740481C1C}">
-                <a14:useLocalDpi xmlns="" xmlns:a14="http://schemas.microsoft.com/office/drawing/2010/main" val="0"/>
+                <a14:useLocalDpi xmlns:a14="http://schemas.microsoft.com/office/drawing/2010/main"/>
               </a:ext>
             </a:extLst>
           </a:blip>
@@ -4815,7 +4960,7 @@
           <a:noFill/>
           <a:extLst>
             <a:ext uri="{909E8E84-426E-40DD-AFC4-6F175D3DCCD1}">
-              <a14:hiddenFill xmlns="" xmlns:a14="http://schemas.microsoft.com/office/drawing/2010/main">
+              <a14:hiddenFill xmlns:a14="http://schemas.microsoft.com/office/drawing/2010/main">
                 <a:solidFill>
                   <a:srgbClr val="FFFFFF"/>
                 </a:solidFill>
@@ -5326,10 +5471,10 @@
           <p:nvPr/>
         </p:nvPicPr>
         <p:blipFill>
-          <a:blip r:embed="rId6">
+          <a:blip r:embed="rId6" cstate="print">
             <a:extLst>
               <a:ext uri="{28A0092B-C50C-407E-A947-70E740481C1C}">
-                <a14:useLocalDpi xmlns="" xmlns:a14="http://schemas.microsoft.com/office/drawing/2010/main" val="0"/>
+                <a14:useLocalDpi xmlns:a14="http://schemas.microsoft.com/office/drawing/2010/main"/>
               </a:ext>
             </a:extLst>
           </a:blip>
@@ -5349,7 +5494,7 @@
           <a:noFill/>
           <a:extLst>
             <a:ext uri="{909E8E84-426E-40DD-AFC4-6F175D3DCCD1}">
-              <a14:hiddenFill xmlns="" xmlns:a14="http://schemas.microsoft.com/office/drawing/2010/main">
+              <a14:hiddenFill xmlns:a14="http://schemas.microsoft.com/office/drawing/2010/main">
                 <a:solidFill>
                   <a:srgbClr val="FFFFFF"/>
                 </a:solidFill>
@@ -5613,10 +5758,10 @@
           <p:nvPr/>
         </p:nvPicPr>
         <p:blipFill>
-          <a:blip r:embed="rId3">
+          <a:blip r:embed="rId3" cstate="email">
             <a:extLst>
               <a:ext uri="{28A0092B-C50C-407E-A947-70E740481C1C}">
-                <a14:useLocalDpi xmlns="" xmlns:a14="http://schemas.microsoft.com/office/drawing/2010/main" val="0"/>
+                <a14:useLocalDpi xmlns:a14="http://schemas.microsoft.com/office/drawing/2010/main"/>
               </a:ext>
             </a:extLst>
           </a:blip>
@@ -5636,7 +5781,7 @@
           <a:noFill/>
           <a:extLst>
             <a:ext uri="{909E8E84-426E-40DD-AFC4-6F175D3DCCD1}">
-              <a14:hiddenFill xmlns="" xmlns:a14="http://schemas.microsoft.com/office/drawing/2010/main">
+              <a14:hiddenFill xmlns:a14="http://schemas.microsoft.com/office/drawing/2010/main">
                 <a:solidFill>
                   <a:srgbClr val="FFFFFF"/>
                 </a:solidFill>
@@ -5654,10 +5799,10 @@
           <p:nvPr/>
         </p:nvPicPr>
         <p:blipFill>
-          <a:blip r:embed="rId5">
+          <a:blip r:embed="rId5" cstate="print">
             <a:extLst>
               <a:ext uri="{28A0092B-C50C-407E-A947-70E740481C1C}">
-                <a14:useLocalDpi xmlns="" xmlns:a14="http://schemas.microsoft.com/office/drawing/2010/main" val="0"/>
+                <a14:useLocalDpi xmlns:a14="http://schemas.microsoft.com/office/drawing/2010/main"/>
               </a:ext>
             </a:extLst>
           </a:blip>
@@ -5677,7 +5822,7 @@
           <a:noFill/>
           <a:extLst>
             <a:ext uri="{909E8E84-426E-40DD-AFC4-6F175D3DCCD1}">
-              <a14:hiddenFill xmlns="" xmlns:a14="http://schemas.microsoft.com/office/drawing/2010/main">
+              <a14:hiddenFill xmlns:a14="http://schemas.microsoft.com/office/drawing/2010/main">
                 <a:solidFill>
                   <a:srgbClr val="FFFFFF"/>
                 </a:solidFill>
@@ -5689,7 +5834,7 @@
     </p:spTree>
     <p:extLst>
       <p:ext uri="{BB962C8B-B14F-4D97-AF65-F5344CB8AC3E}">
-        <p14:creationId xmlns="" xmlns:p14="http://schemas.microsoft.com/office/powerpoint/2010/main" val="1035103290"/>
+        <p14:creationId xmlns:p14="http://schemas.microsoft.com/office/powerpoint/2010/main" val="1035103290"/>
       </p:ext>
     </p:extLst>
   </p:cSld>
@@ -5895,11 +6040,7 @@
             <a:pPr algn="ctr"/>
             <a:r>
               <a:rPr lang="en-US" altLang="ja-JP" sz="1600" b="1" dirty="0" smtClean="0"/>
-              <a:t>Implemented </a:t>
-            </a:r>
-            <a:r>
-              <a:rPr lang="en-US" altLang="ja-JP" sz="1600" b="1" dirty="0" smtClean="0"/>
-              <a:t>by Developer</a:t>
+              <a:t>Implemented by Developer</a:t>
             </a:r>
           </a:p>
           <a:p>
@@ -6306,7 +6447,6 @@
               <a:rPr lang="en-US" altLang="ja-JP" sz="1600" b="1" dirty="0" smtClean="0"/>
               <a:t>Implemented </a:t>
             </a:r>
-            <a:endParaRPr lang="en-US" altLang="ja-JP" sz="1600" b="1" dirty="0" smtClean="0"/>
           </a:p>
           <a:p>
             <a:pPr algn="ctr"/>
@@ -7477,7 +7617,7 @@
     </p:spTree>
     <p:extLst>
       <p:ext uri="{BB962C8B-B14F-4D97-AF65-F5344CB8AC3E}">
-        <p14:creationId xmlns="" xmlns:p14="http://schemas.microsoft.com/office/powerpoint/2010/main" val="2334958573"/>
+        <p14:creationId xmlns:p14="http://schemas.microsoft.com/office/powerpoint/2010/main" val="2334958573"/>
       </p:ext>
     </p:extLst>
   </p:cSld>
@@ -8042,7 +8182,6 @@
               <a:rPr lang="en-US" altLang="ja-JP" sz="1600" b="1" dirty="0" smtClean="0"/>
               <a:t>Implemented </a:t>
             </a:r>
-            <a:endParaRPr lang="en-US" altLang="ja-JP" sz="1600" b="1" dirty="0" smtClean="0"/>
           </a:p>
           <a:p>
             <a:pPr algn="ctr"/>
@@ -8848,11 +8987,7 @@
             <a:pPr algn="ctr"/>
             <a:r>
               <a:rPr lang="en-US" altLang="ja-JP" sz="1600" b="1" dirty="0" smtClean="0"/>
-              <a:t>Implemented </a:t>
-            </a:r>
-            <a:r>
-              <a:rPr lang="en-US" altLang="ja-JP" sz="1600" b="1" dirty="0" smtClean="0"/>
-              <a:t>by Developer</a:t>
+              <a:t>Implemented by Developer</a:t>
             </a:r>
           </a:p>
           <a:p>
@@ -8867,7 +9002,7 @@
     </p:spTree>
     <p:extLst>
       <p:ext uri="{BB962C8B-B14F-4D97-AF65-F5344CB8AC3E}">
-        <p14:creationId xmlns="" xmlns:p14="http://schemas.microsoft.com/office/powerpoint/2010/main" val="2334958573"/>
+        <p14:creationId xmlns:p14="http://schemas.microsoft.com/office/powerpoint/2010/main" val="2334958573"/>
       </p:ext>
     </p:extLst>
   </p:cSld>
@@ -9432,7 +9567,6 @@
               <a:rPr lang="en-US" altLang="ja-JP" sz="1600" b="1" dirty="0" smtClean="0"/>
               <a:t>Implemented </a:t>
             </a:r>
-            <a:endParaRPr lang="en-US" altLang="ja-JP" sz="1600" b="1" dirty="0" smtClean="0"/>
           </a:p>
           <a:p>
             <a:pPr algn="ctr"/>
@@ -10238,11 +10372,7 @@
             <a:pPr algn="ctr"/>
             <a:r>
               <a:rPr lang="en-US" altLang="ja-JP" sz="1600" b="1" dirty="0" smtClean="0"/>
-              <a:t>Implemented </a:t>
-            </a:r>
-            <a:r>
-              <a:rPr lang="en-US" altLang="ja-JP" sz="1600" b="1" dirty="0" smtClean="0"/>
-              <a:t>by Developer</a:t>
+              <a:t>Implemented by Developer</a:t>
             </a:r>
           </a:p>
           <a:p>
@@ -10257,7 +10387,7 @@
     </p:spTree>
     <p:extLst>
       <p:ext uri="{BB962C8B-B14F-4D97-AF65-F5344CB8AC3E}">
-        <p14:creationId xmlns="" xmlns:p14="http://schemas.microsoft.com/office/powerpoint/2010/main" val="2334958573"/>
+        <p14:creationId xmlns:p14="http://schemas.microsoft.com/office/powerpoint/2010/main" val="2334958573"/>
       </p:ext>
     </p:extLst>
   </p:cSld>
@@ -10300,8 +10430,14 @@
           <p:nvPr/>
         </p:nvPicPr>
         <p:blipFill>
-          <a:blip r:embed="rId2"/>
-          <a:srcRect l="379" t="13889" r="80617" b="58796"/>
+          <a:blip r:embed="rId2" cstate="print">
+            <a:extLst>
+              <a:ext uri="{28A0092B-C50C-407E-A947-70E740481C1C}">
+                <a14:useLocalDpi xmlns:a14="http://schemas.microsoft.com/office/drawing/2010/main"/>
+              </a:ext>
+            </a:extLst>
+          </a:blip>
+          <a:srcRect/>
           <a:stretch>
             <a:fillRect/>
           </a:stretch>
@@ -10331,6 +10467,13 @@
   <p:clrMapOvr>
     <a:masterClrMapping/>
   </p:clrMapOvr>
+  <p:timing>
+    <p:tnLst>
+      <p:par>
+        <p:cTn id="1" dur="indefinite" restart="never" nodeType="tmRoot"/>
+      </p:par>
+    </p:tnLst>
+  </p:timing>
 </p:sld>
 </file>
 
@@ -13039,6 +13182,13 @@
   <p:clrMapOvr>
     <a:masterClrMapping/>
   </p:clrMapOvr>
+  <p:timing>
+    <p:tnLst>
+      <p:par>
+        <p:cTn id="1" dur="indefinite" restart="never" nodeType="tmRoot"/>
+      </p:par>
+    </p:tnLst>
+  </p:timing>
 </p:sld>
 </file>
 
@@ -14441,6 +14591,13 @@
   <p:clrMapOvr>
     <a:masterClrMapping/>
   </p:clrMapOvr>
+  <p:timing>
+    <p:tnLst>
+      <p:par>
+        <p:cTn id="1" dur="indefinite" restart="never" nodeType="tmRoot"/>
+      </p:par>
+    </p:tnLst>
+  </p:timing>
 </p:sld>
 </file>
 
@@ -14579,8 +14736,8 @@
         </p:nvSpPr>
         <p:spPr>
           <a:xfrm>
-            <a:off x="623965" y="2075036"/>
-            <a:ext cx="4303636" cy="1993900"/>
+            <a:off x="623965" y="2075035"/>
+            <a:ext cx="4303636" cy="2462193"/>
           </a:xfrm>
           <a:prstGeom prst="roundRect">
             <a:avLst/>
@@ -14697,7 +14854,7 @@
         </p:nvSpPr>
         <p:spPr>
           <a:xfrm>
-            <a:off x="626763" y="4583710"/>
+            <a:off x="626763" y="5035533"/>
             <a:ext cx="4235814" cy="1334490"/>
           </a:xfrm>
           <a:prstGeom prst="roundRect">
@@ -15108,7 +15265,7 @@
         </p:nvSpPr>
         <p:spPr>
           <a:xfrm>
-            <a:off x="623964" y="4744450"/>
+            <a:off x="623964" y="5196273"/>
             <a:ext cx="972256" cy="523220"/>
           </a:xfrm>
           <a:prstGeom prst="rect">
@@ -15514,7 +15671,7 @@
         </p:nvSpPr>
         <p:spPr>
           <a:xfrm>
-            <a:off x="2383542" y="4074650"/>
+            <a:off x="2383542" y="4537228"/>
             <a:ext cx="1323247" cy="338554"/>
           </a:xfrm>
           <a:prstGeom prst="rect">
@@ -15674,7 +15831,7 @@
         </p:nvSpPr>
         <p:spPr>
           <a:xfrm>
-            <a:off x="1814605" y="4073700"/>
+            <a:off x="1814605" y="4536278"/>
             <a:ext cx="431768" cy="510010"/>
           </a:xfrm>
           <a:prstGeom prst="downArrow">
@@ -15852,7 +16009,7 @@
         </p:nvSpPr>
         <p:spPr>
           <a:xfrm rot="18014877">
-            <a:off x="5127730" y="3673093"/>
+            <a:off x="5127730" y="4167941"/>
             <a:ext cx="431768" cy="803115"/>
           </a:xfrm>
           <a:prstGeom prst="downArrow">
@@ -15890,7 +16047,7 @@
         </p:nvSpPr>
         <p:spPr>
           <a:xfrm>
-            <a:off x="4862577" y="4344948"/>
+            <a:off x="4862577" y="4839796"/>
             <a:ext cx="1323247" cy="338554"/>
           </a:xfrm>
           <a:prstGeom prst="rect">
@@ -16050,8 +16207,8 @@
         </p:nvSpPr>
         <p:spPr>
           <a:xfrm>
-            <a:off x="2041401" y="5136158"/>
-            <a:ext cx="1311102" cy="528042"/>
+            <a:off x="1993775" y="5587981"/>
+            <a:ext cx="1582721" cy="528042"/>
           </a:xfrm>
           <a:prstGeom prst="flowChartDocument">
             <a:avLst/>
@@ -16088,10 +16245,74 @@
           <a:p>
             <a:pPr algn="ctr"/>
             <a:r>
-              <a:rPr lang="en-US" altLang="ja-JP" sz="1600" b="1" dirty="0" smtClean="0"/>
-              <a:t>env.xml</a:t>
+              <a:rPr lang="en-US" altLang="ja-JP" sz="1600" b="1" dirty="0" err="1" smtClean="0"/>
+              <a:t>Infra.properties</a:t>
             </a:r>
             <a:endParaRPr lang="en-US" altLang="ja-JP" sz="1600" b="1" dirty="0"/>
+          </a:p>
+        </p:txBody>
+      </p:sp>
+      <p:sp>
+        <p:nvSpPr>
+          <p:cNvPr id="42" name="角丸四角形 41"/>
+          <p:cNvSpPr/>
+          <p:nvPr/>
+        </p:nvSpPr>
+        <p:spPr>
+          <a:xfrm>
+            <a:off x="843177" y="3955440"/>
+            <a:ext cx="2179377" cy="360000"/>
+          </a:xfrm>
+          <a:prstGeom prst="roundRect">
+            <a:avLst/>
+          </a:prstGeom>
+        </p:spPr>
+        <p:style>
+          <a:lnRef idx="1">
+            <a:schemeClr val="accent3"/>
+          </a:lnRef>
+          <a:fillRef idx="3">
+            <a:schemeClr val="accent3"/>
+          </a:fillRef>
+          <a:effectRef idx="2">
+            <a:schemeClr val="accent3"/>
+          </a:effectRef>
+          <a:fontRef idx="minor">
+            <a:schemeClr val="lt1"/>
+          </a:fontRef>
+        </p:style>
+        <p:txBody>
+          <a:bodyPr rtlCol="0" anchor="ctr"/>
+          <a:lstStyle/>
+          <a:p>
+            <a:pPr algn="ctr"/>
+            <a:r>
+              <a:rPr kumimoji="1" lang="en-US" altLang="ja-JP" sz="1600" b="1" dirty="0" err="1" smtClean="0">
+                <a:solidFill>
+                  <a:schemeClr val="bg1"/>
+                </a:solidFill>
+                <a:effectLst>
+                  <a:outerShdw blurRad="38100" dist="38100" dir="2700000" algn="tl">
+                    <a:srgbClr val="000000">
+                      <a:alpha val="43137"/>
+                    </a:srgbClr>
+                  </a:outerShdw>
+                </a:effectLst>
+              </a:rPr>
+              <a:t>ProxyClass</a:t>
+            </a:r>
+            <a:endParaRPr kumimoji="1" lang="ja-JP" altLang="en-US" sz="1600" b="1" dirty="0">
+              <a:solidFill>
+                <a:schemeClr val="bg1"/>
+              </a:solidFill>
+              <a:effectLst>
+                <a:outerShdw blurRad="38100" dist="38100" dir="2700000" algn="tl">
+                  <a:srgbClr val="000000">
+                    <a:alpha val="43137"/>
+                  </a:srgbClr>
+                </a:outerShdw>
+              </a:effectLst>
+            </a:endParaRPr>
           </a:p>
         </p:txBody>
       </p:sp>
@@ -16100,6 +16321,21 @@
   <p:clrMapOvr>
     <a:masterClrMapping/>
   </p:clrMapOvr>
+  <mc:AlternateContent xmlns:mc="http://schemas.openxmlformats.org/markup-compatibility/2006">
+    <mc:Choice xmlns:p14="http://schemas.microsoft.com/office/powerpoint/2010/main" Requires="p14">
+      <p:transition spd="slow" p14:dur="2000"/>
+    </mc:Choice>
+    <mc:Fallback>
+      <p:transition spd="slow"/>
+    </mc:Fallback>
+  </mc:AlternateContent>
+  <p:timing>
+    <p:tnLst>
+      <p:par>
+        <p:cTn id="1" dur="indefinite" restart="never" nodeType="tmRoot"/>
+      </p:par>
+    </p:tnLst>
+  </p:timing>
 </p:sld>
 </file>
 
@@ -17698,6 +17934,13 @@
   <p:clrMapOvr>
     <a:masterClrMapping/>
   </p:clrMapOvr>
+  <p:timing>
+    <p:tnLst>
+      <p:par>
+        <p:cTn id="1" dur="indefinite" restart="never" nodeType="tmRoot"/>
+      </p:par>
+    </p:tnLst>
+  </p:timing>
 </p:sld>
 </file>
 
@@ -18088,6 +18331,13 @@
   <p:clrMapOvr>
     <a:masterClrMapping/>
   </p:clrMapOvr>
+  <p:timing>
+    <p:tnLst>
+      <p:par>
+        <p:cTn id="1" dur="indefinite" restart="never" nodeType="tmRoot"/>
+      </p:par>
+    </p:tnLst>
+  </p:timing>
 </p:sld>
 </file>
 
@@ -19415,7 +19665,7 @@
     </p:spTree>
     <p:extLst>
       <p:ext uri="{BB962C8B-B14F-4D97-AF65-F5344CB8AC3E}">
-        <p14:creationId xmlns="" xmlns:p14="http://schemas.microsoft.com/office/powerpoint/2010/main" val="2334958573"/>
+        <p14:creationId xmlns:p14="http://schemas.microsoft.com/office/powerpoint/2010/main" val="2334958573"/>
       </p:ext>
     </p:extLst>
   </p:cSld>

</xml_diff>